<commit_message>
changed a work on ppt
</commit_message>
<xml_diff>
--- a/Development of an Acoustic Tension Cable.pptx
+++ b/Development of an Acoustic Tension Cable.pptx
@@ -250,7 +250,7 @@
           <a:p>
             <a:fld id="{C32BC457-2858-4BE3-9F34-AF33D696A2D1}" type="datetimeFigureOut">
               <a:rPr lang="en-US" smtClean="0"/>
-              <a:t>11/11/2014</a:t>
+              <a:t>11/23/2014</a:t>
             </a:fld>
             <a:endParaRPr lang="en-US"/>
           </a:p>
@@ -420,7 +420,7 @@
           <a:p>
             <a:fld id="{C32BC457-2858-4BE3-9F34-AF33D696A2D1}" type="datetimeFigureOut">
               <a:rPr lang="en-US" smtClean="0"/>
-              <a:t>11/11/2014</a:t>
+              <a:t>11/23/2014</a:t>
             </a:fld>
             <a:endParaRPr lang="en-US"/>
           </a:p>
@@ -600,7 +600,7 @@
           <a:p>
             <a:fld id="{C32BC457-2858-4BE3-9F34-AF33D696A2D1}" type="datetimeFigureOut">
               <a:rPr lang="en-US" smtClean="0"/>
-              <a:t>11/11/2014</a:t>
+              <a:t>11/23/2014</a:t>
             </a:fld>
             <a:endParaRPr lang="en-US"/>
           </a:p>
@@ -770,7 +770,7 @@
           <a:p>
             <a:fld id="{C32BC457-2858-4BE3-9F34-AF33D696A2D1}" type="datetimeFigureOut">
               <a:rPr lang="en-US" smtClean="0"/>
-              <a:t>11/11/2014</a:t>
+              <a:t>11/23/2014</a:t>
             </a:fld>
             <a:endParaRPr lang="en-US"/>
           </a:p>
@@ -1016,7 +1016,7 @@
           <a:p>
             <a:fld id="{C32BC457-2858-4BE3-9F34-AF33D696A2D1}" type="datetimeFigureOut">
               <a:rPr lang="en-US" smtClean="0"/>
-              <a:t>11/11/2014</a:t>
+              <a:t>11/23/2014</a:t>
             </a:fld>
             <a:endParaRPr lang="en-US"/>
           </a:p>
@@ -1248,7 +1248,7 @@
           <a:p>
             <a:fld id="{C32BC457-2858-4BE3-9F34-AF33D696A2D1}" type="datetimeFigureOut">
               <a:rPr lang="en-US" smtClean="0"/>
-              <a:t>11/11/2014</a:t>
+              <a:t>11/23/2014</a:t>
             </a:fld>
             <a:endParaRPr lang="en-US"/>
           </a:p>
@@ -1615,7 +1615,7 @@
           <a:p>
             <a:fld id="{C32BC457-2858-4BE3-9F34-AF33D696A2D1}" type="datetimeFigureOut">
               <a:rPr lang="en-US" smtClean="0"/>
-              <a:t>11/11/2014</a:t>
+              <a:t>11/23/2014</a:t>
             </a:fld>
             <a:endParaRPr lang="en-US"/>
           </a:p>
@@ -1733,7 +1733,7 @@
           <a:p>
             <a:fld id="{C32BC457-2858-4BE3-9F34-AF33D696A2D1}" type="datetimeFigureOut">
               <a:rPr lang="en-US" smtClean="0"/>
-              <a:t>11/11/2014</a:t>
+              <a:t>11/23/2014</a:t>
             </a:fld>
             <a:endParaRPr lang="en-US"/>
           </a:p>
@@ -1828,7 +1828,7 @@
           <a:p>
             <a:fld id="{C32BC457-2858-4BE3-9F34-AF33D696A2D1}" type="datetimeFigureOut">
               <a:rPr lang="en-US" smtClean="0"/>
-              <a:t>11/11/2014</a:t>
+              <a:t>11/23/2014</a:t>
             </a:fld>
             <a:endParaRPr lang="en-US"/>
           </a:p>
@@ -2105,7 +2105,7 @@
           <a:p>
             <a:fld id="{C32BC457-2858-4BE3-9F34-AF33D696A2D1}" type="datetimeFigureOut">
               <a:rPr lang="en-US" smtClean="0"/>
-              <a:t>11/11/2014</a:t>
+              <a:t>11/23/2014</a:t>
             </a:fld>
             <a:endParaRPr lang="en-US"/>
           </a:p>
@@ -2358,7 +2358,7 @@
           <a:p>
             <a:fld id="{C32BC457-2858-4BE3-9F34-AF33D696A2D1}" type="datetimeFigureOut">
               <a:rPr lang="en-US" smtClean="0"/>
-              <a:t>11/11/2014</a:t>
+              <a:t>11/23/2014</a:t>
             </a:fld>
             <a:endParaRPr lang="en-US"/>
           </a:p>
@@ -2571,7 +2571,7 @@
           <a:p>
             <a:fld id="{C32BC457-2858-4BE3-9F34-AF33D696A2D1}" type="datetimeFigureOut">
               <a:rPr lang="en-US" smtClean="0"/>
-              <a:t>11/11/2014</a:t>
+              <a:t>11/23/2014</a:t>
             </a:fld>
             <a:endParaRPr lang="en-US"/>
           </a:p>
@@ -3575,15 +3575,7 @@
           <a:p>
             <a:r>
               <a:rPr lang="en-US" dirty="0" smtClean="0"/>
-              <a:t>Examples of Passive systems were </a:t>
-            </a:r>
-            <a:r>
-              <a:rPr lang="en-US" dirty="0" smtClean="0"/>
-              <a:t>found; </a:t>
-            </a:r>
-            <a:r>
-              <a:rPr lang="en-US" dirty="0" smtClean="0"/>
-              <a:t>however, wired systems tended to be costly and wireless systems had the large hurdle of time synchronization</a:t>
+              <a:t>Examples of Passive systems were found; however, wired systems tended to be costly and wireless systems had the large hurdle of time synchronization</a:t>
             </a:r>
           </a:p>
           <a:p>
@@ -3627,15 +3619,7 @@
           <a:p>
             <a:r>
               <a:rPr lang="en-US" dirty="0" smtClean="0"/>
-              <a:t>Breaks, snaps, and wearing of the cable </a:t>
-            </a:r>
-            <a:r>
-              <a:rPr lang="en-US" dirty="0" smtClean="0"/>
-              <a:t>will all </a:t>
-            </a:r>
-            <a:r>
-              <a:rPr lang="en-US" dirty="0" smtClean="0"/>
-              <a:t>have effects on the propagation time of sound in the suspension cables</a:t>
+              <a:t>Breaks, snaps, and wearing of the cable will all have effects on the propagation time of sound in the suspension cables</a:t>
             </a:r>
           </a:p>
           <a:p>
@@ -3778,8 +3762,12 @@
               <a:t>Results were gathered and </a:t>
             </a:r>
             <a:r>
-              <a:rPr lang="en-US" dirty="0" err="1" smtClean="0"/>
-              <a:t>Analysed</a:t>
+              <a:rPr lang="en-US" dirty="0"/>
+              <a:t>a</a:t>
+            </a:r>
+            <a:r>
+              <a:rPr lang="en-US" dirty="0" smtClean="0"/>
+              <a:t>nalyzed</a:t>
             </a:r>
             <a:endParaRPr lang="en-US" dirty="0" smtClean="0"/>
           </a:p>
@@ -3895,11 +3883,7 @@
             <a:pPr lvl="1"/>
             <a:r>
               <a:rPr lang="en-US" dirty="0" smtClean="0"/>
-              <a:t>Group/Clamped wire was cut. The wire was then driven and the resulting impulse was </a:t>
-            </a:r>
-            <a:r>
-              <a:rPr lang="en-US" dirty="0" smtClean="0"/>
-              <a:t>identified</a:t>
+              <a:t>Group/Clamped wire was cut. The wire was then driven and the resulting impulse was identified</a:t>
             </a:r>
           </a:p>
           <a:p>
@@ -3910,7 +3894,6 @@
               <a:rPr lang="en-US" dirty="0" smtClean="0"/>
               <a:t>By analyzing the results, the frequency and sample rate for the package were determined.</a:t>
             </a:r>
-            <a:endParaRPr lang="en-US" dirty="0" smtClean="0"/>
           </a:p>
           <a:p>
             <a:pPr lvl="1"/>

</xml_diff>